<commit_message>
login and register form updated
</commit_message>
<xml_diff>
--- a/trodwe.pptx
+++ b/trodwe.pptx
@@ -5,7 +5,7 @@
     <p:sldMasterId id="2147483970" r:id="rId1"/>
   </p:sldMasterIdLst>
   <p:notesMasterIdLst>
-    <p:notesMasterId r:id="rId11"/>
+    <p:notesMasterId r:id="rId14"/>
   </p:notesMasterIdLst>
   <p:sldIdLst>
     <p:sldId id="4149" r:id="rId2"/>
@@ -17,6 +17,9 @@
     <p:sldId id="4154" r:id="rId8"/>
     <p:sldId id="4193" r:id="rId9"/>
     <p:sldId id="4194" r:id="rId10"/>
+    <p:sldId id="4195" r:id="rId11"/>
+    <p:sldId id="4197" r:id="rId12"/>
+    <p:sldId id="4196" r:id="rId13"/>
   </p:sldIdLst>
   <p:sldSz cx="24377650" cy="13716000"/>
   <p:notesSz cx="6858000" cy="9144000"/>
@@ -2047,6 +2050,450 @@
 </p:sld>
 </file>
 
+<file path=ppt/slides/slide10.xml><?xml version="1.0" encoding="utf-8"?>
+<p:sld xmlns:a="http://schemas.openxmlformats.org/drawingml/2006/main" xmlns:r="http://schemas.openxmlformats.org/officeDocument/2006/relationships" xmlns:p="http://schemas.openxmlformats.org/presentationml/2006/main">
+  <p:cSld>
+    <p:spTree>
+      <p:nvGrpSpPr>
+        <p:cNvPr id="1" name=""/>
+        <p:cNvGrpSpPr/>
+        <p:nvPr/>
+      </p:nvGrpSpPr>
+      <p:grpSpPr>
+        <a:xfrm>
+          <a:off x="0" y="0"/>
+          <a:ext cx="0" cy="0"/>
+          <a:chOff x="0" y="0"/>
+          <a:chExt cx="0" cy="0"/>
+        </a:xfrm>
+      </p:grpSpPr>
+      <p:pic>
+        <p:nvPicPr>
+          <p:cNvPr id="3" name="Image 2">
+            <a:extLst>
+              <a:ext uri="{FF2B5EF4-FFF2-40B4-BE49-F238E27FC236}">
+                <a16:creationId xmlns:a16="http://schemas.microsoft.com/office/drawing/2014/main" id="{0C84F818-E6DC-4D42-AB9A-A69335C694E2}"/>
+              </a:ext>
+            </a:extLst>
+          </p:cNvPr>
+          <p:cNvPicPr>
+            <a:picLocks noChangeAspect="1"/>
+          </p:cNvPicPr>
+          <p:nvPr/>
+        </p:nvPicPr>
+        <p:blipFill>
+          <a:blip r:embed="rId2">
+            <a:extLst>
+              <a:ext uri="{28A0092B-C50C-407E-A947-70E740481C1C}">
+                <a14:useLocalDpi xmlns:a14="http://schemas.microsoft.com/office/drawing/2010/main" val="0"/>
+              </a:ext>
+            </a:extLst>
+          </a:blip>
+          <a:stretch>
+            <a:fillRect/>
+          </a:stretch>
+        </p:blipFill>
+        <p:spPr>
+          <a:xfrm>
+            <a:off x="0" y="10109651"/>
+            <a:ext cx="24377650" cy="3606349"/>
+          </a:xfrm>
+          <a:prstGeom prst="rect">
+            <a:avLst/>
+          </a:prstGeom>
+        </p:spPr>
+      </p:pic>
+      <p:sp>
+        <p:nvSpPr>
+          <p:cNvPr id="4" name="ZoneTexte 3">
+            <a:extLst>
+              <a:ext uri="{FF2B5EF4-FFF2-40B4-BE49-F238E27FC236}">
+                <a16:creationId xmlns:a16="http://schemas.microsoft.com/office/drawing/2014/main" id="{5F5EDAD1-525B-43BC-96E2-075501296B1D}"/>
+              </a:ext>
+            </a:extLst>
+          </p:cNvPr>
+          <p:cNvSpPr txBox="1"/>
+          <p:nvPr/>
+        </p:nvSpPr>
+        <p:spPr>
+          <a:xfrm>
+            <a:off x="16112358" y="12509122"/>
+            <a:ext cx="5297214" cy="646331"/>
+          </a:xfrm>
+          <a:prstGeom prst="rect">
+            <a:avLst/>
+          </a:prstGeom>
+          <a:noFill/>
+        </p:spPr>
+        <p:txBody>
+          <a:bodyPr wrap="square" rtlCol="0">
+            <a:spAutoFit/>
+          </a:bodyPr>
+          <a:lstStyle/>
+          <a:p>
+            <a:r>
+              <a:rPr lang="fr-CI" dirty="0">
+                <a:solidFill>
+                  <a:srgbClr val="075D7E"/>
+                </a:solidFill>
+              </a:rPr>
+              <a:t>Réalisé par VAKA Marcel S.</a:t>
+            </a:r>
+          </a:p>
+        </p:txBody>
+      </p:sp>
+      <p:pic>
+        <p:nvPicPr>
+          <p:cNvPr id="6" name="Image 5">
+            <a:extLst>
+              <a:ext uri="{FF2B5EF4-FFF2-40B4-BE49-F238E27FC236}">
+                <a16:creationId xmlns:a16="http://schemas.microsoft.com/office/drawing/2014/main" id="{CC80F05A-9E64-47AE-8EDD-3F6B27F9FCFC}"/>
+              </a:ext>
+            </a:extLst>
+          </p:cNvPr>
+          <p:cNvPicPr>
+            <a:picLocks noChangeAspect="1"/>
+          </p:cNvPicPr>
+          <p:nvPr/>
+        </p:nvPicPr>
+        <p:blipFill>
+          <a:blip r:embed="rId3" cstate="email">
+            <a:extLst>
+              <a:ext uri="{28A0092B-C50C-407E-A947-70E740481C1C}">
+                <a14:useLocalDpi xmlns:a14="http://schemas.microsoft.com/office/drawing/2010/main" val="0"/>
+              </a:ext>
+            </a:extLst>
+          </a:blip>
+          <a:stretch>
+            <a:fillRect/>
+          </a:stretch>
+        </p:blipFill>
+        <p:spPr>
+          <a:xfrm>
+            <a:off x="859001" y="657226"/>
+            <a:ext cx="9339164" cy="4450802"/>
+          </a:xfrm>
+          <a:prstGeom prst="rect">
+            <a:avLst/>
+          </a:prstGeom>
+        </p:spPr>
+      </p:pic>
+      <p:pic>
+        <p:nvPicPr>
+          <p:cNvPr id="8" name="Image 7">
+            <a:extLst>
+              <a:ext uri="{FF2B5EF4-FFF2-40B4-BE49-F238E27FC236}">
+                <a16:creationId xmlns:a16="http://schemas.microsoft.com/office/drawing/2014/main" id="{531A3C23-E628-43C0-B92F-66C254E0A63C}"/>
+              </a:ext>
+            </a:extLst>
+          </p:cNvPr>
+          <p:cNvPicPr>
+            <a:picLocks noChangeAspect="1"/>
+          </p:cNvPicPr>
+          <p:nvPr/>
+        </p:nvPicPr>
+        <p:blipFill>
+          <a:blip r:embed="rId4" cstate="email">
+            <a:extLst>
+              <a:ext uri="{28A0092B-C50C-407E-A947-70E740481C1C}">
+                <a14:useLocalDpi xmlns:a14="http://schemas.microsoft.com/office/drawing/2010/main" val="0"/>
+              </a:ext>
+            </a:extLst>
+          </a:blip>
+          <a:stretch>
+            <a:fillRect/>
+          </a:stretch>
+        </p:blipFill>
+        <p:spPr>
+          <a:xfrm>
+            <a:off x="12814208" y="657226"/>
+            <a:ext cx="7207963" cy="8644429"/>
+          </a:xfrm>
+          <a:prstGeom prst="rect">
+            <a:avLst/>
+          </a:prstGeom>
+        </p:spPr>
+      </p:pic>
+    </p:spTree>
+    <p:extLst>
+      <p:ext uri="{BB962C8B-B14F-4D97-AF65-F5344CB8AC3E}">
+        <p14:creationId xmlns:p14="http://schemas.microsoft.com/office/powerpoint/2010/main" val="3139524346"/>
+      </p:ext>
+    </p:extLst>
+  </p:cSld>
+  <p:clrMapOvr>
+    <a:masterClrMapping/>
+  </p:clrMapOvr>
+</p:sld>
+</file>
+
+<file path=ppt/slides/slide11.xml><?xml version="1.0" encoding="utf-8"?>
+<p:sld xmlns:a="http://schemas.openxmlformats.org/drawingml/2006/main" xmlns:r="http://schemas.openxmlformats.org/officeDocument/2006/relationships" xmlns:p="http://schemas.openxmlformats.org/presentationml/2006/main">
+  <p:cSld>
+    <p:spTree>
+      <p:nvGrpSpPr>
+        <p:cNvPr id="1" name=""/>
+        <p:cNvGrpSpPr/>
+        <p:nvPr/>
+      </p:nvGrpSpPr>
+      <p:grpSpPr>
+        <a:xfrm>
+          <a:off x="0" y="0"/>
+          <a:ext cx="0" cy="0"/>
+          <a:chOff x="0" y="0"/>
+          <a:chExt cx="0" cy="0"/>
+        </a:xfrm>
+      </p:grpSpPr>
+      <p:sp>
+        <p:nvSpPr>
+          <p:cNvPr id="3" name="ZoneTexte 2">
+            <a:extLst>
+              <a:ext uri="{FF2B5EF4-FFF2-40B4-BE49-F238E27FC236}">
+                <a16:creationId xmlns:a16="http://schemas.microsoft.com/office/drawing/2014/main" id="{9E407D00-7581-4305-A2FC-473FE579ADE9}"/>
+              </a:ext>
+            </a:extLst>
+          </p:cNvPr>
+          <p:cNvSpPr txBox="1"/>
+          <p:nvPr/>
+        </p:nvSpPr>
+        <p:spPr>
+          <a:xfrm>
+            <a:off x="3139418" y="5272950"/>
+            <a:ext cx="18098814" cy="2400657"/>
+          </a:xfrm>
+          <a:prstGeom prst="rect">
+            <a:avLst/>
+          </a:prstGeom>
+          <a:noFill/>
+        </p:spPr>
+        <p:txBody>
+          <a:bodyPr wrap="square" rtlCol="0">
+            <a:spAutoFit/>
+          </a:bodyPr>
+          <a:lstStyle/>
+          <a:p>
+            <a:pPr algn="ctr"/>
+            <a:r>
+              <a:rPr lang="fr-CI" sz="15000" dirty="0">
+                <a:solidFill>
+                  <a:srgbClr val="075D7E"/>
+                </a:solidFill>
+              </a:rPr>
+              <a:t>DEMO…</a:t>
+            </a:r>
+          </a:p>
+        </p:txBody>
+      </p:sp>
+      <p:pic>
+        <p:nvPicPr>
+          <p:cNvPr id="4" name="Image 3">
+            <a:extLst>
+              <a:ext uri="{FF2B5EF4-FFF2-40B4-BE49-F238E27FC236}">
+                <a16:creationId xmlns:a16="http://schemas.microsoft.com/office/drawing/2014/main" id="{4816BF39-8EB9-4E77-BEAA-1B2C7021E9E8}"/>
+              </a:ext>
+            </a:extLst>
+          </p:cNvPr>
+          <p:cNvPicPr>
+            <a:picLocks noChangeAspect="1"/>
+          </p:cNvPicPr>
+          <p:nvPr/>
+        </p:nvPicPr>
+        <p:blipFill>
+          <a:blip r:embed="rId2">
+            <a:extLst>
+              <a:ext uri="{28A0092B-C50C-407E-A947-70E740481C1C}">
+                <a14:useLocalDpi xmlns:a14="http://schemas.microsoft.com/office/drawing/2010/main" val="0"/>
+              </a:ext>
+            </a:extLst>
+          </a:blip>
+          <a:stretch>
+            <a:fillRect/>
+          </a:stretch>
+        </p:blipFill>
+        <p:spPr>
+          <a:xfrm>
+            <a:off x="0" y="10109651"/>
+            <a:ext cx="24377650" cy="3606349"/>
+          </a:xfrm>
+          <a:prstGeom prst="rect">
+            <a:avLst/>
+          </a:prstGeom>
+        </p:spPr>
+      </p:pic>
+      <p:sp>
+        <p:nvSpPr>
+          <p:cNvPr id="5" name="ZoneTexte 4">
+            <a:extLst>
+              <a:ext uri="{FF2B5EF4-FFF2-40B4-BE49-F238E27FC236}">
+                <a16:creationId xmlns:a16="http://schemas.microsoft.com/office/drawing/2014/main" id="{B89EF327-3995-4794-8911-10102236D667}"/>
+              </a:ext>
+            </a:extLst>
+          </p:cNvPr>
+          <p:cNvSpPr txBox="1"/>
+          <p:nvPr/>
+        </p:nvSpPr>
+        <p:spPr>
+          <a:xfrm>
+            <a:off x="16112358" y="12509122"/>
+            <a:ext cx="5297214" cy="646331"/>
+          </a:xfrm>
+          <a:prstGeom prst="rect">
+            <a:avLst/>
+          </a:prstGeom>
+          <a:noFill/>
+        </p:spPr>
+        <p:txBody>
+          <a:bodyPr wrap="square" rtlCol="0">
+            <a:spAutoFit/>
+          </a:bodyPr>
+          <a:lstStyle/>
+          <a:p>
+            <a:r>
+              <a:rPr lang="fr-CI" dirty="0">
+                <a:solidFill>
+                  <a:srgbClr val="075D7E"/>
+                </a:solidFill>
+              </a:rPr>
+              <a:t>Réalisé par VAKA Marcel S.</a:t>
+            </a:r>
+          </a:p>
+        </p:txBody>
+      </p:sp>
+    </p:spTree>
+    <p:extLst>
+      <p:ext uri="{BB962C8B-B14F-4D97-AF65-F5344CB8AC3E}">
+        <p14:creationId xmlns:p14="http://schemas.microsoft.com/office/powerpoint/2010/main" val="2336682956"/>
+      </p:ext>
+    </p:extLst>
+  </p:cSld>
+  <p:clrMapOvr>
+    <a:masterClrMapping/>
+  </p:clrMapOvr>
+</p:sld>
+</file>
+
+<file path=ppt/slides/slide12.xml><?xml version="1.0" encoding="utf-8"?>
+<p:sld xmlns:a="http://schemas.openxmlformats.org/drawingml/2006/main" xmlns:r="http://schemas.openxmlformats.org/officeDocument/2006/relationships" xmlns:p="http://schemas.openxmlformats.org/presentationml/2006/main">
+  <p:cSld>
+    <p:spTree>
+      <p:nvGrpSpPr>
+        <p:cNvPr id="1" name=""/>
+        <p:cNvGrpSpPr/>
+        <p:nvPr/>
+      </p:nvGrpSpPr>
+      <p:grpSpPr>
+        <a:xfrm>
+          <a:off x="0" y="0"/>
+          <a:ext cx="0" cy="0"/>
+          <a:chOff x="0" y="0"/>
+          <a:chExt cx="0" cy="0"/>
+        </a:xfrm>
+      </p:grpSpPr>
+      <p:sp>
+        <p:nvSpPr>
+          <p:cNvPr id="3" name="Rectangle 2">
+            <a:extLst>
+              <a:ext uri="{FF2B5EF4-FFF2-40B4-BE49-F238E27FC236}">
+                <a16:creationId xmlns:a16="http://schemas.microsoft.com/office/drawing/2014/main" id="{A87AA52F-1916-4033-8491-9E02C7513473}"/>
+              </a:ext>
+            </a:extLst>
+          </p:cNvPr>
+          <p:cNvSpPr/>
+          <p:nvPr/>
+        </p:nvSpPr>
+        <p:spPr>
+          <a:xfrm>
+            <a:off x="0" y="0"/>
+            <a:ext cx="24377650" cy="13716000"/>
+          </a:xfrm>
+          <a:prstGeom prst="rect">
+            <a:avLst/>
+          </a:prstGeom>
+          <a:solidFill>
+            <a:srgbClr val="075D7E"/>
+          </a:solidFill>
+        </p:spPr>
+        <p:style>
+          <a:lnRef idx="2">
+            <a:schemeClr val="accent1">
+              <a:shade val="50000"/>
+            </a:schemeClr>
+          </a:lnRef>
+          <a:fillRef idx="1">
+            <a:schemeClr val="accent1"/>
+          </a:fillRef>
+          <a:effectRef idx="0">
+            <a:schemeClr val="accent1"/>
+          </a:effectRef>
+          <a:fontRef idx="minor">
+            <a:schemeClr val="lt1"/>
+          </a:fontRef>
+        </p:style>
+        <p:txBody>
+          <a:bodyPr rtlCol="0" anchor="ctr"/>
+          <a:lstStyle/>
+          <a:p>
+            <a:pPr algn="ctr"/>
+            <a:endParaRPr lang="fr-CI"/>
+          </a:p>
+        </p:txBody>
+      </p:sp>
+      <p:sp>
+        <p:nvSpPr>
+          <p:cNvPr id="4" name="ZoneTexte 3">
+            <a:extLst>
+              <a:ext uri="{FF2B5EF4-FFF2-40B4-BE49-F238E27FC236}">
+                <a16:creationId xmlns:a16="http://schemas.microsoft.com/office/drawing/2014/main" id="{72870EDE-B6E9-4638-9E0E-6A1F25425F9A}"/>
+              </a:ext>
+            </a:extLst>
+          </p:cNvPr>
+          <p:cNvSpPr txBox="1"/>
+          <p:nvPr/>
+        </p:nvSpPr>
+        <p:spPr>
+          <a:xfrm>
+            <a:off x="3139418" y="5272950"/>
+            <a:ext cx="18098814" cy="3170099"/>
+          </a:xfrm>
+          <a:prstGeom prst="rect">
+            <a:avLst/>
+          </a:prstGeom>
+          <a:noFill/>
+        </p:spPr>
+        <p:txBody>
+          <a:bodyPr wrap="square" rtlCol="0">
+            <a:spAutoFit/>
+          </a:bodyPr>
+          <a:lstStyle/>
+          <a:p>
+            <a:pPr algn="ctr"/>
+            <a:r>
+              <a:rPr lang="fr-CI" sz="20000" dirty="0">
+                <a:solidFill>
+                  <a:schemeClr val="tx1">
+                    <a:lumMod val="20000"/>
+                    <a:lumOff val="80000"/>
+                  </a:schemeClr>
+                </a:solidFill>
+              </a:rPr>
+              <a:t>MERCI !</a:t>
+            </a:r>
+          </a:p>
+        </p:txBody>
+      </p:sp>
+    </p:spTree>
+    <p:extLst>
+      <p:ext uri="{BB962C8B-B14F-4D97-AF65-F5344CB8AC3E}">
+        <p14:creationId xmlns:p14="http://schemas.microsoft.com/office/powerpoint/2010/main" val="2277899886"/>
+      </p:ext>
+    </p:extLst>
+  </p:cSld>
+  <p:clrMapOvr>
+    <a:masterClrMapping/>
+  </p:clrMapOvr>
+</p:sld>
+</file>
+
 <file path=ppt/slides/slide2.xml><?xml version="1.0" encoding="utf-8"?>
 <p:sld xmlns:a="http://schemas.openxmlformats.org/drawingml/2006/main" xmlns:r="http://schemas.openxmlformats.org/officeDocument/2006/relationships" xmlns:p="http://schemas.openxmlformats.org/presentationml/2006/main">
   <p:cSld>
@@ -3040,7 +3487,7 @@
           <a:lstStyle/>
           <a:p>
             <a:r>
-              <a:rPr lang="fr-CI" sz="12000" b="1" dirty="0" err="1">
+              <a:rPr lang="fr-CI" sz="12000" b="1" dirty="0">
                 <a:solidFill>
                   <a:schemeClr val="bg1"/>
                 </a:solidFill>
@@ -3048,12 +3495,6 @@
               </a:rPr>
               <a:t>TRODWé</a:t>
             </a:r>
-            <a:endParaRPr lang="fr-CI" sz="12000" b="1" dirty="0">
-              <a:solidFill>
-                <a:schemeClr val="bg1"/>
-              </a:solidFill>
-              <a:latin typeface="Lithos Pro Regular" panose="04020505030E02020A04" pitchFamily="82" charset="0"/>
-            </a:endParaRPr>
           </a:p>
         </p:txBody>
       </p:sp>
@@ -3172,7 +3613,7 @@
                   </a:schemeClr>
                 </a:solidFill>
               </a:rPr>
-              <a:t>Matériels informatiques.</a:t>
+              <a:t>Toute sorte d’article.</a:t>
             </a:r>
           </a:p>
         </p:txBody>
@@ -4295,7 +4736,7 @@
           <a:lstStyle/>
           <a:p>
             <a:r>
-              <a:rPr lang="fr-CI" b="1" dirty="0" err="1">
+              <a:rPr lang="fr-CI" b="1" dirty="0">
                 <a:solidFill>
                   <a:srgbClr val="075D7E"/>
                 </a:solidFill>
@@ -4339,7 +4780,7 @@
               <a:t> </a:t>
             </a:r>
             <a:r>
-              <a:rPr lang="fr-CI" b="1" dirty="0" err="1">
+              <a:rPr lang="fr-CI" b="1" dirty="0">
                 <a:solidFill>
                   <a:srgbClr val="075D7E"/>
                 </a:solidFill>
@@ -4813,22 +5254,13 @@
           <a:lstStyle/>
           <a:p>
             <a:r>
-              <a:rPr lang="fr-CI" b="1" dirty="0" err="1">
+              <a:rPr lang="fr-CI" b="1" dirty="0">
                 <a:solidFill>
                   <a:srgbClr val="075D7E"/>
                 </a:solidFill>
                 <a:latin typeface="Lithos Pro Regular" panose="04020505030E02020A04" pitchFamily="82" charset="0"/>
               </a:rPr>
-              <a:t>TRODWé</a:t>
-            </a:r>
-            <a:r>
-              <a:rPr lang="fr-CI" b="1" dirty="0">
-                <a:solidFill>
-                  <a:srgbClr val="075D7E"/>
-                </a:solidFill>
-                <a:latin typeface="Lithos Pro Regular" panose="04020505030E02020A04" pitchFamily="82" charset="0"/>
-              </a:rPr>
-              <a:t>  </a:t>
+              <a:t>TRODWé  </a:t>
             </a:r>
             <a:r>
               <a:rPr lang="fr-CI" sz="5400" dirty="0">
@@ -5575,7 +6007,7 @@
         <p:spPr>
           <a:xfrm>
             <a:off x="1213978" y="3232184"/>
-            <a:ext cx="4947599" cy="7646023"/>
+            <a:ext cx="4947599" cy="6877467"/>
           </a:xfrm>
           <a:prstGeom prst="rect">
             <a:avLst/>
@@ -5620,8 +6052,54 @@
         </p:blipFill>
         <p:spPr>
           <a:xfrm>
-            <a:off x="7222449" y="3232184"/>
-            <a:ext cx="4966376" cy="7646023"/>
+            <a:off x="9271034" y="3232183"/>
+            <a:ext cx="4966376" cy="6877467"/>
+          </a:xfrm>
+          <a:prstGeom prst="rect">
+            <a:avLst/>
+          </a:prstGeom>
+          <a:ln>
+            <a:noFill/>
+          </a:ln>
+          <a:effectLst>
+            <a:outerShdw blurRad="292100" dist="139700" dir="2700000" algn="tl" rotWithShape="0">
+              <a:srgbClr val="333333">
+                <a:alpha val="65000"/>
+              </a:srgbClr>
+            </a:outerShdw>
+          </a:effectLst>
+        </p:spPr>
+      </p:pic>
+      <p:pic>
+        <p:nvPicPr>
+          <p:cNvPr id="15" name="Image 14">
+            <a:extLst>
+              <a:ext uri="{FF2B5EF4-FFF2-40B4-BE49-F238E27FC236}">
+                <a16:creationId xmlns:a16="http://schemas.microsoft.com/office/drawing/2014/main" id="{0D91ADE3-549A-4508-9B96-AD341E9319A3}"/>
+              </a:ext>
+            </a:extLst>
+          </p:cNvPr>
+          <p:cNvPicPr>
+            <a:picLocks noChangeAspect="1"/>
+          </p:cNvPicPr>
+          <p:nvPr/>
+        </p:nvPicPr>
+        <p:blipFill>
+          <a:blip r:embed="rId4" cstate="email">
+            <a:extLst>
+              <a:ext uri="{28A0092B-C50C-407E-A947-70E740481C1C}">
+                <a14:useLocalDpi xmlns:a14="http://schemas.microsoft.com/office/drawing/2010/main" val="0"/>
+              </a:ext>
+            </a:extLst>
+          </a:blip>
+          <a:stretch>
+            <a:fillRect/>
+          </a:stretch>
+        </p:blipFill>
+        <p:spPr>
+          <a:xfrm>
+            <a:off x="17458522" y="3232184"/>
+            <a:ext cx="4966376" cy="6877467"/>
           </a:xfrm>
           <a:prstGeom prst="rect">
             <a:avLst/>
@@ -5653,7 +6131,7 @@
           <p:nvPr/>
         </p:nvPicPr>
         <p:blipFill>
-          <a:blip r:embed="rId4">
+          <a:blip r:embed="rId5">
             <a:extLst>
               <a:ext uri="{28A0092B-C50C-407E-A947-70E740481C1C}">
                 <a14:useLocalDpi xmlns:a14="http://schemas.microsoft.com/office/drawing/2010/main" val="0"/>
@@ -5674,6 +6152,45 @@
           </a:prstGeom>
         </p:spPr>
       </p:pic>
+      <p:sp>
+        <p:nvSpPr>
+          <p:cNvPr id="13" name="ZoneTexte 12">
+            <a:extLst>
+              <a:ext uri="{FF2B5EF4-FFF2-40B4-BE49-F238E27FC236}">
+                <a16:creationId xmlns:a16="http://schemas.microsoft.com/office/drawing/2014/main" id="{21575B4E-EACA-44D0-ADAE-545D98390330}"/>
+              </a:ext>
+            </a:extLst>
+          </p:cNvPr>
+          <p:cNvSpPr txBox="1"/>
+          <p:nvPr/>
+        </p:nvSpPr>
+        <p:spPr>
+          <a:xfrm>
+            <a:off x="16112358" y="12509122"/>
+            <a:ext cx="5297214" cy="646331"/>
+          </a:xfrm>
+          <a:prstGeom prst="rect">
+            <a:avLst/>
+          </a:prstGeom>
+          <a:noFill/>
+        </p:spPr>
+        <p:txBody>
+          <a:bodyPr wrap="square" rtlCol="0">
+            <a:spAutoFit/>
+          </a:bodyPr>
+          <a:lstStyle/>
+          <a:p>
+            <a:r>
+              <a:rPr lang="fr-CI" dirty="0">
+                <a:solidFill>
+                  <a:srgbClr val="075D7E"/>
+                </a:solidFill>
+              </a:rPr>
+              <a:t>Réalisé par VAKA Marcel S.</a:t>
+            </a:r>
+          </a:p>
+        </p:txBody>
+      </p:sp>
     </p:spTree>
     <p:extLst>
       <p:ext uri="{BB962C8B-B14F-4D97-AF65-F5344CB8AC3E}">

</xml_diff>